<commit_message>
updates with SCAN package
</commit_message>
<xml_diff>
--- a/patchwork example.pptx
+++ b/patchwork example.pptx
@@ -6,6 +6,7 @@
   </p:sldMasterIdLst>
   <p:sldIdLst>
     <p:sldId id="256" r:id="rId2"/>
+    <p:sldId id="257" r:id="rId3"/>
   </p:sldIdLst>
   <p:sldSz cx="11887200" cy="11887200"/>
   <p:notesSz cx="6858000" cy="9144000"/>
@@ -104,6 +105,11 @@
       </a:defRPr>
     </a:lvl9pPr>
   </p:defaultTextStyle>
+  <p:extLst>
+    <p:ext uri="{EFAFB233-063F-42B5-8137-9DF3F51BA10A}">
+      <p15:sldGuideLst xmlns:p15="http://schemas.microsoft.com/office/powerpoint/2012/main"/>
+    </p:ext>
+  </p:extLst>
 </p:presentation>
 </file>
 
@@ -238,7 +244,7 @@
           <a:p>
             <a:fld id="{2FEB0EF4-E394-E349-8C54-9B3449F2CA78}" type="datetimeFigureOut">
               <a:rPr lang="en-US" smtClean="0"/>
-              <a:t>11/3/20</a:t>
+              <a:t>11/11/20</a:t>
             </a:fld>
             <a:endParaRPr lang="en-US"/>
           </a:p>
@@ -408,7 +414,7 @@
           <a:p>
             <a:fld id="{2FEB0EF4-E394-E349-8C54-9B3449F2CA78}" type="datetimeFigureOut">
               <a:rPr lang="en-US" smtClean="0"/>
-              <a:t>11/3/20</a:t>
+              <a:t>11/11/20</a:t>
             </a:fld>
             <a:endParaRPr lang="en-US"/>
           </a:p>
@@ -588,7 +594,7 @@
           <a:p>
             <a:fld id="{2FEB0EF4-E394-E349-8C54-9B3449F2CA78}" type="datetimeFigureOut">
               <a:rPr lang="en-US" smtClean="0"/>
-              <a:t>11/3/20</a:t>
+              <a:t>11/11/20</a:t>
             </a:fld>
             <a:endParaRPr lang="en-US"/>
           </a:p>
@@ -758,7 +764,7 @@
           <a:p>
             <a:fld id="{2FEB0EF4-E394-E349-8C54-9B3449F2CA78}" type="datetimeFigureOut">
               <a:rPr lang="en-US" smtClean="0"/>
-              <a:t>11/3/20</a:t>
+              <a:t>11/11/20</a:t>
             </a:fld>
             <a:endParaRPr lang="en-US"/>
           </a:p>
@@ -1002,7 +1008,7 @@
           <a:p>
             <a:fld id="{2FEB0EF4-E394-E349-8C54-9B3449F2CA78}" type="datetimeFigureOut">
               <a:rPr lang="en-US" smtClean="0"/>
-              <a:t>11/3/20</a:t>
+              <a:t>11/11/20</a:t>
             </a:fld>
             <a:endParaRPr lang="en-US"/>
           </a:p>
@@ -1234,7 +1240,7 @@
           <a:p>
             <a:fld id="{2FEB0EF4-E394-E349-8C54-9B3449F2CA78}" type="datetimeFigureOut">
               <a:rPr lang="en-US" smtClean="0"/>
-              <a:t>11/3/20</a:t>
+              <a:t>11/11/20</a:t>
             </a:fld>
             <a:endParaRPr lang="en-US"/>
           </a:p>
@@ -1601,7 +1607,7 @@
           <a:p>
             <a:fld id="{2FEB0EF4-E394-E349-8C54-9B3449F2CA78}" type="datetimeFigureOut">
               <a:rPr lang="en-US" smtClean="0"/>
-              <a:t>11/3/20</a:t>
+              <a:t>11/11/20</a:t>
             </a:fld>
             <a:endParaRPr lang="en-US"/>
           </a:p>
@@ -1719,7 +1725,7 @@
           <a:p>
             <a:fld id="{2FEB0EF4-E394-E349-8C54-9B3449F2CA78}" type="datetimeFigureOut">
               <a:rPr lang="en-US" smtClean="0"/>
-              <a:t>11/3/20</a:t>
+              <a:t>11/11/20</a:t>
             </a:fld>
             <a:endParaRPr lang="en-US"/>
           </a:p>
@@ -1814,7 +1820,7 @@
           <a:p>
             <a:fld id="{2FEB0EF4-E394-E349-8C54-9B3449F2CA78}" type="datetimeFigureOut">
               <a:rPr lang="en-US" smtClean="0"/>
-              <a:t>11/3/20</a:t>
+              <a:t>11/11/20</a:t>
             </a:fld>
             <a:endParaRPr lang="en-US"/>
           </a:p>
@@ -2091,7 +2097,7 @@
           <a:p>
             <a:fld id="{2FEB0EF4-E394-E349-8C54-9B3449F2CA78}" type="datetimeFigureOut">
               <a:rPr lang="en-US" smtClean="0"/>
-              <a:t>11/3/20</a:t>
+              <a:t>11/11/20</a:t>
             </a:fld>
             <a:endParaRPr lang="en-US"/>
           </a:p>
@@ -2348,7 +2354,7 @@
           <a:p>
             <a:fld id="{2FEB0EF4-E394-E349-8C54-9B3449F2CA78}" type="datetimeFigureOut">
               <a:rPr lang="en-US" smtClean="0"/>
-              <a:t>11/3/20</a:t>
+              <a:t>11/11/20</a:t>
             </a:fld>
             <a:endParaRPr lang="en-US"/>
           </a:p>
@@ -2561,7 +2567,7 @@
           <a:p>
             <a:fld id="{2FEB0EF4-E394-E349-8C54-9B3449F2CA78}" type="datetimeFigureOut">
               <a:rPr lang="en-US" smtClean="0"/>
-              <a:t>11/3/20</a:t>
+              <a:t>11/11/20</a:t>
             </a:fld>
             <a:endParaRPr lang="en-US"/>
           </a:p>
@@ -3229,6 +3235,286 @@
 </p:sld>
 </file>
 
+<file path=ppt/slides/slide2.xml><?xml version="1.0" encoding="utf-8"?>
+<p:sld xmlns:a="http://schemas.openxmlformats.org/drawingml/2006/main" xmlns:r="http://schemas.openxmlformats.org/officeDocument/2006/relationships" xmlns:p="http://schemas.openxmlformats.org/presentationml/2006/main">
+  <p:cSld>
+    <p:spTree>
+      <p:nvGrpSpPr>
+        <p:cNvPr id="1" name=""/>
+        <p:cNvGrpSpPr/>
+        <p:nvPr/>
+      </p:nvGrpSpPr>
+      <p:grpSpPr>
+        <a:xfrm>
+          <a:off x="0" y="0"/>
+          <a:ext cx="0" cy="0"/>
+          <a:chOff x="0" y="0"/>
+          <a:chExt cx="0" cy="0"/>
+        </a:xfrm>
+      </p:grpSpPr>
+      <p:pic>
+        <p:nvPicPr>
+          <p:cNvPr id="2" name="Picture 1">
+            <a:extLst>
+              <a:ext uri="{FF2B5EF4-FFF2-40B4-BE49-F238E27FC236}">
+                <a16:creationId xmlns:a16="http://schemas.microsoft.com/office/drawing/2014/main" id="{14683B63-0E1C-034F-A33D-0C593B875254}"/>
+              </a:ext>
+            </a:extLst>
+          </p:cNvPr>
+          <p:cNvPicPr>
+            <a:picLocks noChangeAspect="1"/>
+          </p:cNvPicPr>
+          <p:nvPr/>
+        </p:nvPicPr>
+        <p:blipFill>
+          <a:blip r:embed="rId2"/>
+          <a:stretch>
+            <a:fillRect/>
+          </a:stretch>
+        </p:blipFill>
+        <p:spPr>
+          <a:xfrm>
+            <a:off x="847032" y="1293961"/>
+            <a:ext cx="9720356" cy="8867955"/>
+          </a:xfrm>
+          <a:prstGeom prst="rect">
+            <a:avLst/>
+          </a:prstGeom>
+        </p:spPr>
+      </p:pic>
+      <p:cxnSp>
+        <p:nvCxnSpPr>
+          <p:cNvPr id="3" name="Straight Connector 2">
+            <a:extLst>
+              <a:ext uri="{FF2B5EF4-FFF2-40B4-BE49-F238E27FC236}">
+                <a16:creationId xmlns:a16="http://schemas.microsoft.com/office/drawing/2014/main" id="{7A93872C-647A-8A43-AC19-4ABA0579D128}"/>
+              </a:ext>
+            </a:extLst>
+          </p:cNvPr>
+          <p:cNvCxnSpPr>
+            <a:cxnSpLocks/>
+          </p:cNvCxnSpPr>
+          <p:nvPr/>
+        </p:nvCxnSpPr>
+        <p:spPr>
+          <a:xfrm>
+            <a:off x="4244196" y="1587260"/>
+            <a:ext cx="0" cy="3838755"/>
+          </a:xfrm>
+          <a:prstGeom prst="line">
+            <a:avLst/>
+          </a:prstGeom>
+          <a:ln>
+            <a:solidFill>
+              <a:schemeClr val="tx1"/>
+            </a:solidFill>
+            <a:prstDash val="dash"/>
+          </a:ln>
+        </p:spPr>
+        <p:style>
+          <a:lnRef idx="1">
+            <a:schemeClr val="accent1"/>
+          </a:lnRef>
+          <a:fillRef idx="0">
+            <a:schemeClr val="accent1"/>
+          </a:fillRef>
+          <a:effectRef idx="0">
+            <a:schemeClr val="accent1"/>
+          </a:effectRef>
+          <a:fontRef idx="minor">
+            <a:schemeClr val="tx1"/>
+          </a:fontRef>
+        </p:style>
+      </p:cxnSp>
+      <p:cxnSp>
+        <p:nvCxnSpPr>
+          <p:cNvPr id="4" name="Straight Connector 3">
+            <a:extLst>
+              <a:ext uri="{FF2B5EF4-FFF2-40B4-BE49-F238E27FC236}">
+                <a16:creationId xmlns:a16="http://schemas.microsoft.com/office/drawing/2014/main" id="{15AD6B9D-9019-734B-8B4E-900A85EAF41B}"/>
+              </a:ext>
+            </a:extLst>
+          </p:cNvPr>
+          <p:cNvCxnSpPr>
+            <a:cxnSpLocks/>
+          </p:cNvCxnSpPr>
+          <p:nvPr/>
+        </p:nvCxnSpPr>
+        <p:spPr>
+          <a:xfrm>
+            <a:off x="6001110" y="5426015"/>
+            <a:ext cx="0" cy="2803585"/>
+          </a:xfrm>
+          <a:prstGeom prst="line">
+            <a:avLst/>
+          </a:prstGeom>
+          <a:ln>
+            <a:solidFill>
+              <a:schemeClr val="tx1"/>
+            </a:solidFill>
+            <a:prstDash val="dash"/>
+          </a:ln>
+        </p:spPr>
+        <p:style>
+          <a:lnRef idx="1">
+            <a:schemeClr val="accent1"/>
+          </a:lnRef>
+          <a:fillRef idx="0">
+            <a:schemeClr val="accent1"/>
+          </a:fillRef>
+          <a:effectRef idx="0">
+            <a:schemeClr val="accent1"/>
+          </a:effectRef>
+          <a:fontRef idx="minor">
+            <a:schemeClr val="tx1"/>
+          </a:fontRef>
+        </p:style>
+      </p:cxnSp>
+      <p:cxnSp>
+        <p:nvCxnSpPr>
+          <p:cNvPr id="5" name="Straight Connector 4">
+            <a:extLst>
+              <a:ext uri="{FF2B5EF4-FFF2-40B4-BE49-F238E27FC236}">
+                <a16:creationId xmlns:a16="http://schemas.microsoft.com/office/drawing/2014/main" id="{6AD2EE70-7E2B-494E-B8BD-1F5E4E0B4568}"/>
+              </a:ext>
+            </a:extLst>
+          </p:cNvPr>
+          <p:cNvCxnSpPr>
+            <a:cxnSpLocks/>
+          </p:cNvCxnSpPr>
+          <p:nvPr/>
+        </p:nvCxnSpPr>
+        <p:spPr>
+          <a:xfrm>
+            <a:off x="7177177" y="8229600"/>
+            <a:ext cx="1" cy="1155940"/>
+          </a:xfrm>
+          <a:prstGeom prst="line">
+            <a:avLst/>
+          </a:prstGeom>
+          <a:ln>
+            <a:solidFill>
+              <a:schemeClr val="tx1"/>
+            </a:solidFill>
+            <a:prstDash val="dash"/>
+          </a:ln>
+        </p:spPr>
+        <p:style>
+          <a:lnRef idx="1">
+            <a:schemeClr val="accent1"/>
+          </a:lnRef>
+          <a:fillRef idx="0">
+            <a:schemeClr val="accent1"/>
+          </a:fillRef>
+          <a:effectRef idx="0">
+            <a:schemeClr val="accent1"/>
+          </a:effectRef>
+          <a:fontRef idx="minor">
+            <a:schemeClr val="tx1"/>
+          </a:fontRef>
+        </p:style>
+      </p:cxnSp>
+      <p:cxnSp>
+        <p:nvCxnSpPr>
+          <p:cNvPr id="6" name="Straight Connector 5">
+            <a:extLst>
+              <a:ext uri="{FF2B5EF4-FFF2-40B4-BE49-F238E27FC236}">
+                <a16:creationId xmlns:a16="http://schemas.microsoft.com/office/drawing/2014/main" id="{96463980-77F3-A74A-B0C1-3E024EBEBDA6}"/>
+              </a:ext>
+            </a:extLst>
+          </p:cNvPr>
+          <p:cNvCxnSpPr>
+            <a:cxnSpLocks/>
+          </p:cNvCxnSpPr>
+          <p:nvPr/>
+        </p:nvCxnSpPr>
+        <p:spPr>
+          <a:xfrm>
+            <a:off x="4244196" y="5426015"/>
+            <a:ext cx="1756914" cy="0"/>
+          </a:xfrm>
+          <a:prstGeom prst="line">
+            <a:avLst/>
+          </a:prstGeom>
+          <a:ln>
+            <a:solidFill>
+              <a:schemeClr val="tx1"/>
+            </a:solidFill>
+            <a:prstDash val="dash"/>
+          </a:ln>
+        </p:spPr>
+        <p:style>
+          <a:lnRef idx="1">
+            <a:schemeClr val="accent1"/>
+          </a:lnRef>
+          <a:fillRef idx="0">
+            <a:schemeClr val="accent1"/>
+          </a:fillRef>
+          <a:effectRef idx="0">
+            <a:schemeClr val="accent1"/>
+          </a:effectRef>
+          <a:fontRef idx="minor">
+            <a:schemeClr val="tx1"/>
+          </a:fontRef>
+        </p:style>
+      </p:cxnSp>
+      <p:cxnSp>
+        <p:nvCxnSpPr>
+          <p:cNvPr id="7" name="Straight Connector 6">
+            <a:extLst>
+              <a:ext uri="{FF2B5EF4-FFF2-40B4-BE49-F238E27FC236}">
+                <a16:creationId xmlns:a16="http://schemas.microsoft.com/office/drawing/2014/main" id="{45E0D618-B72F-1449-98FC-1D7DC5ADBA0A}"/>
+              </a:ext>
+            </a:extLst>
+          </p:cNvPr>
+          <p:cNvCxnSpPr>
+            <a:cxnSpLocks/>
+          </p:cNvCxnSpPr>
+          <p:nvPr/>
+        </p:nvCxnSpPr>
+        <p:spPr>
+          <a:xfrm>
+            <a:off x="6001110" y="8229600"/>
+            <a:ext cx="1176067" cy="0"/>
+          </a:xfrm>
+          <a:prstGeom prst="line">
+            <a:avLst/>
+          </a:prstGeom>
+          <a:ln>
+            <a:solidFill>
+              <a:schemeClr val="tx1"/>
+            </a:solidFill>
+            <a:prstDash val="dash"/>
+          </a:ln>
+        </p:spPr>
+        <p:style>
+          <a:lnRef idx="1">
+            <a:schemeClr val="accent1"/>
+          </a:lnRef>
+          <a:fillRef idx="0">
+            <a:schemeClr val="accent1"/>
+          </a:fillRef>
+          <a:effectRef idx="0">
+            <a:schemeClr val="accent1"/>
+          </a:effectRef>
+          <a:fontRef idx="minor">
+            <a:schemeClr val="tx1"/>
+          </a:fontRef>
+        </p:style>
+      </p:cxnSp>
+    </p:spTree>
+    <p:extLst>
+      <p:ext uri="{BB962C8B-B14F-4D97-AF65-F5344CB8AC3E}">
+        <p14:creationId xmlns:p14="http://schemas.microsoft.com/office/powerpoint/2010/main" val="4085499466"/>
+      </p:ext>
+    </p:extLst>
+  </p:cSld>
+  <p:clrMapOvr>
+    <a:masterClrMapping/>
+  </p:clrMapOvr>
+</p:sld>
+</file>
+
 <file path=ppt/theme/theme1.xml><?xml version="1.0" encoding="utf-8"?>
 <a:theme xmlns:a="http://schemas.openxmlformats.org/drawingml/2006/main" name="Office Theme">
   <a:themeElements>

</xml_diff>